<commit_message>
Modify the favourite command sequence diagram
</commit_message>
<xml_diff>
--- a/docs/diagrams/FavouriteCommandSequenceDiagram.pptx
+++ b/docs/diagrams/FavouriteCommandSequenceDiagram.pptx
@@ -208,7 +208,7 @@
           <a:p>
             <a:fld id="{F5CC4B3F-88C1-4FFA-B1B6-F41C21DC6924}" type="datetimeFigureOut">
               <a:rPr lang="en-US" smtClean="0"/>
-              <a:t>4/9/2018</a:t>
+              <a:t>4/12/2018</a:t>
             </a:fld>
             <a:endParaRPr lang="en-US"/>
           </a:p>
@@ -738,7 +738,7 @@
           <a:p>
             <a:fld id="{78C97017-6FC3-485B-9764-EAC9E56C1D49}" type="datetimeFigureOut">
               <a:rPr lang="en-US" smtClean="0"/>
-              <a:t>4/9/2018</a:t>
+              <a:t>4/12/2018</a:t>
             </a:fld>
             <a:endParaRPr lang="en-US"/>
           </a:p>
@@ -906,7 +906,7 @@
           <a:p>
             <a:fld id="{78C97017-6FC3-485B-9764-EAC9E56C1D49}" type="datetimeFigureOut">
               <a:rPr lang="en-US" smtClean="0"/>
-              <a:t>4/9/2018</a:t>
+              <a:t>4/12/2018</a:t>
             </a:fld>
             <a:endParaRPr lang="en-US"/>
           </a:p>
@@ -1084,7 +1084,7 @@
           <a:p>
             <a:fld id="{78C97017-6FC3-485B-9764-EAC9E56C1D49}" type="datetimeFigureOut">
               <a:rPr lang="en-US" smtClean="0"/>
-              <a:t>4/9/2018</a:t>
+              <a:t>4/12/2018</a:t>
             </a:fld>
             <a:endParaRPr lang="en-US"/>
           </a:p>
@@ -1252,7 +1252,7 @@
           <a:p>
             <a:fld id="{78C97017-6FC3-485B-9764-EAC9E56C1D49}" type="datetimeFigureOut">
               <a:rPr lang="en-US" smtClean="0"/>
-              <a:t>4/9/2018</a:t>
+              <a:t>4/12/2018</a:t>
             </a:fld>
             <a:endParaRPr lang="en-US"/>
           </a:p>
@@ -1497,7 +1497,7 @@
           <a:p>
             <a:fld id="{78C97017-6FC3-485B-9764-EAC9E56C1D49}" type="datetimeFigureOut">
               <a:rPr lang="en-US" smtClean="0"/>
-              <a:t>4/9/2018</a:t>
+              <a:t>4/12/2018</a:t>
             </a:fld>
             <a:endParaRPr lang="en-US"/>
           </a:p>
@@ -1782,7 +1782,7 @@
           <a:p>
             <a:fld id="{78C97017-6FC3-485B-9764-EAC9E56C1D49}" type="datetimeFigureOut">
               <a:rPr lang="en-US" smtClean="0"/>
-              <a:t>4/9/2018</a:t>
+              <a:t>4/12/2018</a:t>
             </a:fld>
             <a:endParaRPr lang="en-US"/>
           </a:p>
@@ -2201,7 +2201,7 @@
           <a:p>
             <a:fld id="{78C97017-6FC3-485B-9764-EAC9E56C1D49}" type="datetimeFigureOut">
               <a:rPr lang="en-US" smtClean="0"/>
-              <a:t>4/9/2018</a:t>
+              <a:t>4/12/2018</a:t>
             </a:fld>
             <a:endParaRPr lang="en-US"/>
           </a:p>
@@ -2318,7 +2318,7 @@
           <a:p>
             <a:fld id="{78C97017-6FC3-485B-9764-EAC9E56C1D49}" type="datetimeFigureOut">
               <a:rPr lang="en-US" smtClean="0"/>
-              <a:t>4/9/2018</a:t>
+              <a:t>4/12/2018</a:t>
             </a:fld>
             <a:endParaRPr lang="en-US"/>
           </a:p>
@@ -2413,7 +2413,7 @@
           <a:p>
             <a:fld id="{78C97017-6FC3-485B-9764-EAC9E56C1D49}" type="datetimeFigureOut">
               <a:rPr lang="en-US" smtClean="0"/>
-              <a:t>4/9/2018</a:t>
+              <a:t>4/12/2018</a:t>
             </a:fld>
             <a:endParaRPr lang="en-US"/>
           </a:p>
@@ -2688,7 +2688,7 @@
           <a:p>
             <a:fld id="{78C97017-6FC3-485B-9764-EAC9E56C1D49}" type="datetimeFigureOut">
               <a:rPr lang="en-US" smtClean="0"/>
-              <a:t>4/9/2018</a:t>
+              <a:t>4/12/2018</a:t>
             </a:fld>
             <a:endParaRPr lang="en-US"/>
           </a:p>
@@ -2940,7 +2940,7 @@
           <a:p>
             <a:fld id="{78C97017-6FC3-485B-9764-EAC9E56C1D49}" type="datetimeFigureOut">
               <a:rPr lang="en-US" smtClean="0"/>
-              <a:t>4/9/2018</a:t>
+              <a:t>4/12/2018</a:t>
             </a:fld>
             <a:endParaRPr lang="en-US"/>
           </a:p>
@@ -3151,7 +3151,7 @@
           <a:p>
             <a:fld id="{78C97017-6FC3-485B-9764-EAC9E56C1D49}" type="datetimeFigureOut">
               <a:rPr lang="en-US" smtClean="0"/>
-              <a:t>4/9/2018</a:t>
+              <a:t>4/12/2018</a:t>
             </a:fld>
             <a:endParaRPr lang="en-US"/>
           </a:p>
@@ -3867,7 +3867,7 @@
                   <a:srgbClr val="0070C0"/>
                 </a:solidFill>
               </a:rPr>
-              <a:t>execute(“undo”)</a:t>
+              <a:t>execute(“fav 1”)</a:t>
             </a:r>
           </a:p>
         </p:txBody>
@@ -6060,11 +6060,11 @@
             <a:avLst/>
           </a:prstGeom>
           <a:solidFill>
-            <a:srgbClr val="0070C0"/>
+            <a:srgbClr val="7030A0"/>
           </a:solidFill>
           <a:ln w="19050">
             <a:solidFill>
-              <a:srgbClr val="0070C0"/>
+              <a:srgbClr val="7030A0"/>
             </a:solidFill>
           </a:ln>
           <a:effectLst/>
@@ -6136,7 +6136,7 @@
           </a:prstGeom>
           <a:ln w="19050">
             <a:solidFill>
-              <a:srgbClr val="0070C0"/>
+              <a:srgbClr val="7030A0"/>
             </a:solidFill>
             <a:prstDash val="sysDash"/>
           </a:ln>
@@ -6178,11 +6178,11 @@
             <a:avLst/>
           </a:prstGeom>
           <a:solidFill>
-            <a:srgbClr val="0070C0"/>
+            <a:srgbClr val="7030A0"/>
           </a:solidFill>
           <a:ln>
             <a:solidFill>
-              <a:srgbClr val="0070C0"/>
+              <a:srgbClr val="7030A0"/>
             </a:solidFill>
           </a:ln>
           <a:effectLst/>
@@ -6295,11 +6295,19 @@
           <a:p>
             <a:pPr algn="l"/>
             <a:r>
-              <a:rPr lang="en-US" dirty="0" err="1"/>
+              <a:rPr lang="en-US" dirty="0" err="1">
+                <a:solidFill>
+                  <a:srgbClr val="7030A0"/>
+                </a:solidFill>
+              </a:rPr>
               <a:t>updateStudent</a:t>
             </a:r>
             <a:r>
-              <a:rPr lang="en-US" dirty="0"/>
+              <a:rPr lang="en-US" dirty="0">
+                <a:solidFill>
+                  <a:srgbClr val="7030A0"/>
+                </a:solidFill>
+              </a:rPr>
               <a:t>()</a:t>
             </a:r>
           </a:p>
@@ -6329,7 +6337,7 @@
           </a:prstGeom>
           <a:ln w="19050">
             <a:solidFill>
-              <a:srgbClr val="0070C0"/>
+              <a:srgbClr val="7030A0"/>
             </a:solidFill>
             <a:prstDash val="sysDash"/>
             <a:headEnd type="arrow" w="med" len="med"/>

</xml_diff>

<commit_message>
added moreInfo command sequence diagram
</commit_message>
<xml_diff>
--- a/docs/diagrams/FavouriteCommandSequenceDiagram.pptx
+++ b/docs/diagrams/FavouriteCommandSequenceDiagram.pptx
@@ -208,7 +208,7 @@
           <a:p>
             <a:fld id="{F5CC4B3F-88C1-4FFA-B1B6-F41C21DC6924}" type="datetimeFigureOut">
               <a:rPr lang="en-US" smtClean="0"/>
-              <a:t>4/9/2018</a:t>
+              <a:t>14-Apr-18</a:t>
             </a:fld>
             <a:endParaRPr lang="en-US"/>
           </a:p>
@@ -738,7 +738,7 @@
           <a:p>
             <a:fld id="{78C97017-6FC3-485B-9764-EAC9E56C1D49}" type="datetimeFigureOut">
               <a:rPr lang="en-US" smtClean="0"/>
-              <a:t>4/9/2018</a:t>
+              <a:t>14-Apr-18</a:t>
             </a:fld>
             <a:endParaRPr lang="en-US"/>
           </a:p>
@@ -906,7 +906,7 @@
           <a:p>
             <a:fld id="{78C97017-6FC3-485B-9764-EAC9E56C1D49}" type="datetimeFigureOut">
               <a:rPr lang="en-US" smtClean="0"/>
-              <a:t>4/9/2018</a:t>
+              <a:t>14-Apr-18</a:t>
             </a:fld>
             <a:endParaRPr lang="en-US"/>
           </a:p>
@@ -1084,7 +1084,7 @@
           <a:p>
             <a:fld id="{78C97017-6FC3-485B-9764-EAC9E56C1D49}" type="datetimeFigureOut">
               <a:rPr lang="en-US" smtClean="0"/>
-              <a:t>4/9/2018</a:t>
+              <a:t>14-Apr-18</a:t>
             </a:fld>
             <a:endParaRPr lang="en-US"/>
           </a:p>
@@ -1252,7 +1252,7 @@
           <a:p>
             <a:fld id="{78C97017-6FC3-485B-9764-EAC9E56C1D49}" type="datetimeFigureOut">
               <a:rPr lang="en-US" smtClean="0"/>
-              <a:t>4/9/2018</a:t>
+              <a:t>14-Apr-18</a:t>
             </a:fld>
             <a:endParaRPr lang="en-US"/>
           </a:p>
@@ -1497,7 +1497,7 @@
           <a:p>
             <a:fld id="{78C97017-6FC3-485B-9764-EAC9E56C1D49}" type="datetimeFigureOut">
               <a:rPr lang="en-US" smtClean="0"/>
-              <a:t>4/9/2018</a:t>
+              <a:t>14-Apr-18</a:t>
             </a:fld>
             <a:endParaRPr lang="en-US"/>
           </a:p>
@@ -1782,7 +1782,7 @@
           <a:p>
             <a:fld id="{78C97017-6FC3-485B-9764-EAC9E56C1D49}" type="datetimeFigureOut">
               <a:rPr lang="en-US" smtClean="0"/>
-              <a:t>4/9/2018</a:t>
+              <a:t>14-Apr-18</a:t>
             </a:fld>
             <a:endParaRPr lang="en-US"/>
           </a:p>
@@ -2201,7 +2201,7 @@
           <a:p>
             <a:fld id="{78C97017-6FC3-485B-9764-EAC9E56C1D49}" type="datetimeFigureOut">
               <a:rPr lang="en-US" smtClean="0"/>
-              <a:t>4/9/2018</a:t>
+              <a:t>14-Apr-18</a:t>
             </a:fld>
             <a:endParaRPr lang="en-US"/>
           </a:p>
@@ -2318,7 +2318,7 @@
           <a:p>
             <a:fld id="{78C97017-6FC3-485B-9764-EAC9E56C1D49}" type="datetimeFigureOut">
               <a:rPr lang="en-US" smtClean="0"/>
-              <a:t>4/9/2018</a:t>
+              <a:t>14-Apr-18</a:t>
             </a:fld>
             <a:endParaRPr lang="en-US"/>
           </a:p>
@@ -2413,7 +2413,7 @@
           <a:p>
             <a:fld id="{78C97017-6FC3-485B-9764-EAC9E56C1D49}" type="datetimeFigureOut">
               <a:rPr lang="en-US" smtClean="0"/>
-              <a:t>4/9/2018</a:t>
+              <a:t>14-Apr-18</a:t>
             </a:fld>
             <a:endParaRPr lang="en-US"/>
           </a:p>
@@ -2688,7 +2688,7 @@
           <a:p>
             <a:fld id="{78C97017-6FC3-485B-9764-EAC9E56C1D49}" type="datetimeFigureOut">
               <a:rPr lang="en-US" smtClean="0"/>
-              <a:t>4/9/2018</a:t>
+              <a:t>14-Apr-18</a:t>
             </a:fld>
             <a:endParaRPr lang="en-US"/>
           </a:p>
@@ -2940,7 +2940,7 @@
           <a:p>
             <a:fld id="{78C97017-6FC3-485B-9764-EAC9E56C1D49}" type="datetimeFigureOut">
               <a:rPr lang="en-US" smtClean="0"/>
-              <a:t>4/9/2018</a:t>
+              <a:t>14-Apr-18</a:t>
             </a:fld>
             <a:endParaRPr lang="en-US"/>
           </a:p>
@@ -3151,7 +3151,7 @@
           <a:p>
             <a:fld id="{78C97017-6FC3-485B-9764-EAC9E56C1D49}" type="datetimeFigureOut">
               <a:rPr lang="en-US" smtClean="0"/>
-              <a:t>4/9/2018</a:t>
+              <a:t>14-Apr-18</a:t>
             </a:fld>
             <a:endParaRPr lang="en-US"/>
           </a:p>
@@ -3867,7 +3867,7 @@
                   <a:srgbClr val="0070C0"/>
                 </a:solidFill>
               </a:rPr>
-              <a:t>execute(“undo”)</a:t>
+              <a:t>execute(“fav 1”)</a:t>
             </a:r>
           </a:p>
         </p:txBody>

</xml_diff>